<commit_message>
Correciones para la presentación
</commit_message>
<xml_diff>
--- a/Presentaciones/Plantilla Pres 2_2012.pptx
+++ b/Presentaciones/Plantilla Pres 2_2012.pptx
@@ -21,18 +21,17 @@
     <p:sldId id="311" r:id="rId15"/>
     <p:sldId id="322" r:id="rId16"/>
     <p:sldId id="312" r:id="rId17"/>
-    <p:sldId id="313" r:id="rId18"/>
-    <p:sldId id="314" r:id="rId19"/>
-    <p:sldId id="297" r:id="rId20"/>
-    <p:sldId id="318" r:id="rId21"/>
-    <p:sldId id="317" r:id="rId22"/>
-    <p:sldId id="316" r:id="rId23"/>
-    <p:sldId id="315" r:id="rId24"/>
-    <p:sldId id="320" r:id="rId25"/>
-    <p:sldId id="319" r:id="rId26"/>
-    <p:sldId id="305" r:id="rId27"/>
-    <p:sldId id="306" r:id="rId28"/>
-    <p:sldId id="294" r:id="rId29"/>
+    <p:sldId id="314" r:id="rId18"/>
+    <p:sldId id="297" r:id="rId19"/>
+    <p:sldId id="318" r:id="rId20"/>
+    <p:sldId id="317" r:id="rId21"/>
+    <p:sldId id="316" r:id="rId22"/>
+    <p:sldId id="315" r:id="rId23"/>
+    <p:sldId id="320" r:id="rId24"/>
+    <p:sldId id="319" r:id="rId25"/>
+    <p:sldId id="305" r:id="rId26"/>
+    <p:sldId id="306" r:id="rId27"/>
+    <p:sldId id="294" r:id="rId28"/>
   </p:sldIdLst>
   <p:sldSz cx="9144000" cy="6858000" type="screen4x3"/>
   <p:notesSz cx="6858000" cy="9144000"/>
@@ -3935,15 +3934,7 @@
             </a:r>
             <a:r>
               <a:rPr lang="es-ES" sz="1800" dirty="0" smtClean="0"/>
-              <a:t>categor</a:t>
-            </a:r>
-            <a:r>
-              <a:rPr lang="es-ES" sz="1800" dirty="0" smtClean="0"/>
-              <a:t>í</a:t>
-            </a:r>
-            <a:r>
-              <a:rPr lang="es-ES" sz="1800" dirty="0" smtClean="0"/>
-              <a:t>a, pasan </a:t>
+              <a:t>categoría, pasan </a:t>
             </a:r>
             <a:r>
               <a:rPr lang="es-ES" sz="1800" dirty="0"/>
@@ -3973,7 +3964,6 @@
               <a:rPr lang="es-ES" sz="1800" dirty="0"/>
               <a:t>que se llevaran a cabo para completarlo. </a:t>
             </a:r>
-            <a:endParaRPr lang="es-ES" sz="1800" dirty="0"/>
           </a:p>
           <a:p>
             <a:pPr algn="just">
@@ -3983,23 +3973,7 @@
             </a:pPr>
             <a:r>
               <a:rPr lang="es-ES" sz="1800" dirty="0" smtClean="0"/>
-              <a:t>La calendarización</a:t>
-            </a:r>
-            <a:r>
-              <a:rPr lang="es-ES" sz="1800" dirty="0" smtClean="0"/>
-              <a:t> de las tareas es </a:t>
-            </a:r>
-            <a:r>
-              <a:rPr lang="es-ES" sz="1800" dirty="0" smtClean="0"/>
-              <a:t>a trav</a:t>
-            </a:r>
-            <a:r>
-              <a:rPr lang="es-ES" sz="1800" dirty="0" smtClean="0"/>
-              <a:t>é</a:t>
-            </a:r>
-            <a:r>
-              <a:rPr lang="es-ES" sz="1800" dirty="0" smtClean="0"/>
-              <a:t>s </a:t>
+              <a:t>La calendarización de las tareas es a través </a:t>
             </a:r>
             <a:r>
               <a:rPr lang="es-ES" sz="1800" dirty="0"/>
@@ -4007,11 +3981,7 @@
             </a:r>
             <a:r>
               <a:rPr lang="es-ES" sz="1800" dirty="0" smtClean="0"/>
-              <a:t>á</a:t>
-            </a:r>
-            <a:r>
-              <a:rPr lang="es-ES" sz="1800" dirty="0" smtClean="0"/>
-              <a:t>rea</a:t>
+              <a:t>área</a:t>
             </a:r>
             <a:r>
               <a:rPr lang="es-ES" sz="1800" dirty="0"/>
@@ -4035,15 +4005,7 @@
             </a:r>
             <a:r>
               <a:rPr lang="es-ES" sz="1800" dirty="0" smtClean="0"/>
-              <a:t>aplicaci</a:t>
-            </a:r>
-            <a:r>
-              <a:rPr lang="es-ES" sz="1800" dirty="0" smtClean="0"/>
-              <a:t>ó</a:t>
-            </a:r>
-            <a:r>
-              <a:rPr lang="es-ES" sz="1800" dirty="0" smtClean="0"/>
-              <a:t>n </a:t>
+              <a:t>aplicación </a:t>
             </a:r>
             <a:r>
               <a:rPr lang="es-ES" sz="1800" dirty="0"/>
@@ -4089,7 +4051,6 @@
               <a:rPr lang="es-ES" sz="1800" dirty="0"/>
               <a:t>completado. </a:t>
             </a:r>
-            <a:endParaRPr lang="es-ES" sz="1800" dirty="0"/>
           </a:p>
           <a:p>
             <a:pPr marL="0" indent="0" algn="just">
@@ -4170,15 +4131,7 @@
             </a:r>
             <a:r>
               <a:rPr lang="es-ES_tradnl" dirty="0" smtClean="0"/>
-              <a:t>actual – Metodolog</a:t>
-            </a:r>
-            <a:r>
-              <a:rPr lang="es-ES_tradnl" dirty="0" smtClean="0"/>
-              <a:t>í</a:t>
-            </a:r>
-            <a:r>
-              <a:rPr lang="es-ES_tradnl" dirty="0" smtClean="0"/>
-              <a:t>a </a:t>
+              <a:t>actual – Metodología </a:t>
             </a:r>
             <a:r>
               <a:rPr lang="es-ES_tradnl" dirty="0"/>
@@ -4266,15 +4219,7 @@
             </a:r>
             <a:r>
               <a:rPr lang="es-ES" sz="1600" dirty="0" smtClean="0"/>
-              <a:t>configuraci</a:t>
-            </a:r>
-            <a:r>
-              <a:rPr lang="es-ES" sz="1600" dirty="0" smtClean="0"/>
-              <a:t>ó</a:t>
-            </a:r>
-            <a:r>
-              <a:rPr lang="es-ES" sz="1600" dirty="0" smtClean="0"/>
-              <a:t>n </a:t>
+              <a:t>configuración </a:t>
             </a:r>
             <a:r>
               <a:rPr lang="es-ES" sz="1600" dirty="0"/>
@@ -4282,15 +4227,7 @@
             </a:r>
             <a:r>
               <a:rPr lang="es-ES" sz="1600" dirty="0" smtClean="0"/>
-              <a:t>Identificaci</a:t>
-            </a:r>
-            <a:r>
-              <a:rPr lang="es-ES" sz="1600" dirty="0" smtClean="0"/>
-              <a:t>ó</a:t>
-            </a:r>
-            <a:r>
-              <a:rPr lang="es-ES" sz="1600" dirty="0" smtClean="0"/>
-              <a:t>n </a:t>
+              <a:t>Identificación </a:t>
             </a:r>
             <a:r>
               <a:rPr lang="es-ES" sz="1600" dirty="0"/>
@@ -4298,15 +4235,7 @@
             </a:r>
             <a:r>
               <a:rPr lang="es-ES" sz="1600" dirty="0" smtClean="0"/>
-              <a:t>Configuraci</a:t>
-            </a:r>
-            <a:r>
-              <a:rPr lang="es-ES" sz="1600" dirty="0" smtClean="0"/>
-              <a:t>ó</a:t>
-            </a:r>
-            <a:r>
-              <a:rPr lang="es-ES" sz="1600" dirty="0" smtClean="0"/>
-              <a:t>n </a:t>
+              <a:t>Configuración </a:t>
             </a:r>
             <a:r>
               <a:rPr lang="es-ES" sz="1600" dirty="0"/>
@@ -4314,15 +4243,7 @@
             </a:r>
             <a:r>
               <a:rPr lang="es-ES" sz="1600" dirty="0" smtClean="0"/>
-              <a:t>Configuraci</a:t>
-            </a:r>
-            <a:r>
-              <a:rPr lang="es-ES" sz="1600" dirty="0" smtClean="0"/>
-              <a:t>ó</a:t>
-            </a:r>
-            <a:r>
-              <a:rPr lang="es-ES" sz="1600" dirty="0" smtClean="0"/>
-              <a:t>n.</a:t>
+              <a:t>Configuración.</a:t>
             </a:r>
             <a:endParaRPr lang="es-ES_tradnl" sz="1600" dirty="0"/>
           </a:p>
@@ -4345,15 +4266,7 @@
             </a:r>
             <a:r>
               <a:rPr lang="es-ES_tradnl" sz="1600" dirty="0" smtClean="0"/>
-              <a:t>metodolog</a:t>
-            </a:r>
-            <a:r>
-              <a:rPr lang="es-ES_tradnl" sz="1600" dirty="0" smtClean="0"/>
-              <a:t>í</a:t>
-            </a:r>
-            <a:r>
-              <a:rPr lang="es-ES_tradnl" sz="1600" dirty="0" smtClean="0"/>
-              <a:t>a</a:t>
+              <a:t>metodología</a:t>
             </a:r>
             <a:r>
               <a:rPr lang="es-ES_tradnl" sz="1600" dirty="0"/>
@@ -4377,15 +4290,7 @@
             </a:r>
             <a:r>
               <a:rPr lang="es-ES_tradnl" sz="1600" dirty="0" smtClean="0"/>
-              <a:t>metodolog</a:t>
-            </a:r>
-            <a:r>
-              <a:rPr lang="es-ES_tradnl" sz="1600" dirty="0" smtClean="0"/>
-              <a:t>í</a:t>
-            </a:r>
-            <a:r>
-              <a:rPr lang="es-ES_tradnl" sz="1600" dirty="0" smtClean="0"/>
-              <a:t>a </a:t>
+              <a:t>metodología </a:t>
             </a:r>
             <a:r>
               <a:rPr lang="es-ES_tradnl" sz="1600" dirty="0"/>
@@ -4393,11 +4298,7 @@
             </a:r>
             <a:r>
               <a:rPr lang="es-ES_tradnl" sz="1600" dirty="0" smtClean="0"/>
-              <a:t>á</a:t>
-            </a:r>
-            <a:r>
-              <a:rPr lang="es-ES_tradnl" sz="1600" dirty="0" smtClean="0"/>
-              <a:t>rea </a:t>
+              <a:t>área </a:t>
             </a:r>
             <a:r>
               <a:rPr lang="es-ES_tradnl" sz="1600" dirty="0"/>
@@ -4416,15 +4317,7 @@
             </a:pPr>
             <a:r>
               <a:rPr lang="es-ES_tradnl" sz="1600" b="1" i="1" dirty="0" smtClean="0"/>
-              <a:t>Formaci</a:t>
-            </a:r>
-            <a:r>
-              <a:rPr lang="es-ES_tradnl" sz="1600" b="1" i="1" dirty="0" smtClean="0"/>
-              <a:t>ó</a:t>
-            </a:r>
-            <a:r>
-              <a:rPr lang="es-ES_tradnl" sz="1600" b="1" i="1" dirty="0" smtClean="0"/>
-              <a:t>n: </a:t>
+              <a:t>Formación: </a:t>
             </a:r>
             <a:r>
               <a:rPr lang="es-ES_tradnl" sz="1600" dirty="0"/>
@@ -4480,11 +4373,7 @@
             </a:pPr>
             <a:r>
               <a:rPr lang="es-ES_tradnl" sz="1600" dirty="0" smtClean="0"/>
-              <a:t>Identificaci</a:t>
-            </a:r>
-            <a:r>
-              <a:rPr lang="es-ES_tradnl" sz="1600" dirty="0" smtClean="0"/>
-              <a:t>ón de la Configuración.</a:t>
+              <a:t>Identificación de la Configuración.</a:t>
             </a:r>
           </a:p>
           <a:p>
@@ -4698,20 +4587,13 @@
             </a:r>
             <a:r>
               <a:rPr lang="es-ES" dirty="0" smtClean="0"/>
-              <a:t>problema y solución propuesta </a:t>
-            </a:r>
-            <a:r>
-              <a:rPr lang="es-ES" dirty="0"/>
-              <a:t>(</a:t>
-            </a:r>
-            <a:r>
-              <a:rPr lang="es-ES" dirty="0" err="1"/>
-              <a:t>máx</a:t>
-            </a:r>
-            <a:r>
-              <a:rPr lang="es-ES" dirty="0"/>
-              <a:t> 2)</a:t>
-            </a:r>
+              <a:t>problema y solución </a:t>
+            </a:r>
+            <a:r>
+              <a:rPr lang="es-ES" dirty="0" smtClean="0"/>
+              <a:t>propuesta</a:t>
+            </a:r>
+            <a:endParaRPr lang="es-ES" dirty="0"/>
           </a:p>
         </p:txBody>
       </p:sp>
@@ -4850,9 +4732,6 @@
               </a:rPr>
               <a:t>Desarrollar una aplicación para la solicitud y gestión de requerimientos y SCM para la Dirección de Servicios de Información y Computación de la Universidad de Valparaíso (DISICO). </a:t>
             </a:r>
-            <a:endParaRPr lang="es-ES" dirty="0">
-              <a:latin typeface="Arial" charset="0"/>
-            </a:endParaRPr>
           </a:p>
         </p:txBody>
       </p:sp>
@@ -5075,18 +4954,7 @@
               <a:rPr lang="es-ES" dirty="0" smtClean="0"/>
               <a:t>problema y solución propuesta </a:t>
             </a:r>
-            <a:r>
-              <a:rPr lang="es-ES" dirty="0"/>
-              <a:t>(</a:t>
-            </a:r>
-            <a:r>
-              <a:rPr lang="es-ES" dirty="0" err="1"/>
-              <a:t>máx</a:t>
-            </a:r>
-            <a:r>
-              <a:rPr lang="es-ES" dirty="0"/>
-              <a:t> 2)</a:t>
-            </a:r>
+            <a:endParaRPr lang="es-ES" dirty="0"/>
           </a:p>
         </p:txBody>
       </p:sp>
@@ -5116,6 +4984,30 @@
               <a:buFont typeface="Wingdings" pitchFamily="2" charset="2"/>
               <a:buNone/>
             </a:pPr>
+            <a:r>
+              <a:rPr lang="es-ES_tradnl" dirty="0" smtClean="0"/>
+              <a:t>Sistema</a:t>
+            </a:r>
+          </a:p>
+          <a:p>
+            <a:pPr algn="just">
+              <a:buFont typeface="Wingdings" pitchFamily="2" charset="2"/>
+              <a:buNone/>
+            </a:pPr>
+            <a:r>
+              <a:rPr lang="es-ES_tradnl" dirty="0" smtClean="0"/>
+              <a:t>Entregables</a:t>
+            </a:r>
+          </a:p>
+          <a:p>
+            <a:pPr algn="just">
+              <a:buFont typeface="Wingdings" pitchFamily="2" charset="2"/>
+              <a:buNone/>
+            </a:pPr>
+            <a:r>
+              <a:rPr lang="es-ES_tradnl" dirty="0" smtClean="0"/>
+              <a:t>Manuales</a:t>
+            </a:r>
             <a:endParaRPr lang="es-ES_tradnl" dirty="0"/>
           </a:p>
         </p:txBody>
@@ -5174,20 +5066,13 @@
             </a:r>
             <a:r>
               <a:rPr lang="es-ES" dirty="0" smtClean="0"/>
-              <a:t>problema y solución propuesta </a:t>
-            </a:r>
-            <a:r>
-              <a:rPr lang="es-ES" dirty="0"/>
-              <a:t>(</a:t>
-            </a:r>
-            <a:r>
-              <a:rPr lang="es-ES" dirty="0" err="1"/>
-              <a:t>máx</a:t>
-            </a:r>
-            <a:r>
-              <a:rPr lang="es-ES" dirty="0"/>
-              <a:t> 2)</a:t>
-            </a:r>
+              <a:t>problema y solución </a:t>
+            </a:r>
+            <a:r>
+              <a:rPr lang="es-ES" dirty="0" smtClean="0"/>
+              <a:t>propuesta</a:t>
+            </a:r>
+            <a:endParaRPr lang="es-ES" dirty="0"/>
           </a:p>
         </p:txBody>
       </p:sp>
@@ -5209,8 +5094,16 @@
             <a:pPr algn="just"/>
             <a:r>
               <a:rPr lang="es-ES_tradnl" dirty="0" smtClean="0"/>
-              <a:t>Impacto</a:t>
-            </a:r>
+              <a:t>Metodología</a:t>
+            </a:r>
+          </a:p>
+          <a:p>
+            <a:pPr algn="just"/>
+            <a:r>
+              <a:rPr lang="es-ES_tradnl" dirty="0" smtClean="0"/>
+              <a:t>Pegar imagen anterior</a:t>
+            </a:r>
+            <a:endParaRPr lang="es-ES_tradnl" dirty="0"/>
           </a:p>
           <a:p>
             <a:pPr algn="just">
@@ -5224,7 +5117,7 @@
     </p:spTree>
     <p:extLst>
       <p:ext uri="{BB962C8B-B14F-4D97-AF65-F5344CB8AC3E}">
-        <p14:creationId xmlns:p14="http://schemas.microsoft.com/office/powerpoint/2010/main" val="3025679640"/>
+        <p14:creationId xmlns:p14="http://schemas.microsoft.com/office/powerpoint/2010/main" val="2195754992"/>
       </p:ext>
     </p:extLst>
   </p:cSld>
@@ -5263,7 +5156,7 @@
       </p:grpSpPr>
       <p:sp>
         <p:nvSpPr>
-          <p:cNvPr id="10242" name="Rectangle 2"/>
+          <p:cNvPr id="60418" name="Rectangle 2"/>
           <p:cNvSpPr>
             <a:spLocks noGrp="1" noChangeArrowheads="1"/>
           </p:cNvSpPr>
@@ -5277,31 +5170,24 @@
           <a:lstStyle/>
           <a:p>
             <a:r>
-              <a:rPr lang="es-ES" dirty="0"/>
-              <a:t>Definición del </a:t>
-            </a:r>
-            <a:r>
-              <a:rPr lang="es-ES" dirty="0" smtClean="0"/>
-              <a:t>problema y solución propuesta </a:t>
-            </a:r>
-            <a:r>
-              <a:rPr lang="es-ES" dirty="0"/>
-              <a:t>(</a:t>
-            </a:r>
-            <a:r>
-              <a:rPr lang="es-ES" dirty="0" err="1"/>
-              <a:t>máx</a:t>
-            </a:r>
-            <a:r>
-              <a:rPr lang="es-ES" dirty="0"/>
-              <a:t> 2)</a:t>
-            </a:r>
+              <a:rPr lang="es-ES" sz="2000" dirty="0" smtClean="0"/>
+              <a:t>Análisis</a:t>
+            </a:r>
+            <a:r>
+              <a:rPr lang="es-ES_tradnl" sz="2000" dirty="0"/>
+              <a:t> </a:t>
+            </a:r>
+            <a:r>
+              <a:rPr lang="es-ES_tradnl" sz="2000" dirty="0" smtClean="0"/>
+              <a:t>– Requerimientos Funcionales</a:t>
+            </a:r>
+            <a:endParaRPr lang="es-ES" sz="2000" dirty="0"/>
           </a:p>
         </p:txBody>
       </p:sp>
       <p:sp>
         <p:nvSpPr>
-          <p:cNvPr id="10243" name="Rectangle 3"/>
+          <p:cNvPr id="60419" name="Rectangle 3"/>
           <p:cNvSpPr>
             <a:spLocks noGrp="1" noChangeArrowheads="1"/>
           </p:cNvSpPr>
@@ -5309,33 +5195,153 @@
             <p:ph type="body" idx="1"/>
           </p:nvPr>
         </p:nvSpPr>
-        <p:spPr/>
+        <p:spPr>
+          <a:xfrm>
+            <a:off x="468313" y="2133601"/>
+            <a:ext cx="8229600" cy="4438672"/>
+          </a:xfrm>
+        </p:spPr>
         <p:txBody>
           <a:bodyPr/>
           <a:lstStyle/>
           <a:p>
-            <a:pPr algn="just"/>
-            <a:r>
-              <a:rPr lang="es-ES_tradnl" dirty="0" smtClean="0"/>
-              <a:t>Metodología</a:t>
-            </a:r>
-            <a:endParaRPr lang="es-ES_tradnl" dirty="0"/>
-          </a:p>
-          <a:p>
             <a:pPr algn="just">
-              <a:buFont typeface="Wingdings" pitchFamily="2" charset="2"/>
+              <a:spcBef>
+                <a:spcPts val="1000"/>
+              </a:spcBef>
+              <a:spcAft>
+                <a:spcPts val="600"/>
+              </a:spcAft>
+            </a:pPr>
+            <a:r>
+              <a:rPr lang="es-ES" sz="1800" dirty="0"/>
+              <a:t>Crear y enviar solicitudes de requerimientos, dirigida a cualquiera de las 3 </a:t>
+            </a:r>
+            <a:r>
+              <a:rPr lang="es-ES" sz="1800" dirty="0" smtClean="0"/>
+              <a:t>áreas </a:t>
+            </a:r>
+            <a:r>
+              <a:rPr lang="es-ES" sz="1800" dirty="0"/>
+              <a:t>de </a:t>
+            </a:r>
+            <a:r>
+              <a:rPr lang="es-ES" sz="1800" dirty="0" smtClean="0"/>
+              <a:t>DISICO.</a:t>
+            </a:r>
+          </a:p>
+          <a:p>
+            <a:pPr algn="just">
+              <a:spcBef>
+                <a:spcPts val="1000"/>
+              </a:spcBef>
+              <a:spcAft>
+                <a:spcPts val="600"/>
+              </a:spcAft>
+            </a:pPr>
+            <a:r>
+              <a:rPr lang="es-ES" sz="1800" dirty="0"/>
+              <a:t>Enviar al email del solicitante el numero de consulta de su solicitud. </a:t>
+            </a:r>
+            <a:endParaRPr lang="es-ES" sz="1800" dirty="0" smtClean="0"/>
+          </a:p>
+          <a:p>
+            <a:pPr algn="just">
+              <a:spcBef>
+                <a:spcPts val="1000"/>
+              </a:spcBef>
+              <a:spcAft>
+                <a:spcPts val="600"/>
+              </a:spcAft>
+            </a:pPr>
+            <a:r>
+              <a:rPr lang="es-ES" sz="1800" dirty="0" smtClean="0"/>
+              <a:t>Asignar Responsables a las Solicitudes.</a:t>
+            </a:r>
+          </a:p>
+          <a:p>
+            <a:pPr algn="just">
+              <a:spcBef>
+                <a:spcPts val="1000"/>
+              </a:spcBef>
+              <a:spcAft>
+                <a:spcPts val="600"/>
+              </a:spcAft>
+            </a:pPr>
+            <a:r>
+              <a:rPr lang="es-ES" sz="1800" dirty="0" smtClean="0"/>
+              <a:t>Transferir solicitudes entre las áreas del departamento.</a:t>
+            </a:r>
+          </a:p>
+          <a:p>
+            <a:pPr algn="just">
+              <a:spcBef>
+                <a:spcPts val="1000"/>
+              </a:spcBef>
+              <a:spcAft>
+                <a:spcPts val="600"/>
+              </a:spcAft>
+            </a:pPr>
+            <a:r>
+              <a:rPr lang="es-ES" sz="1800" dirty="0" smtClean="0"/>
+              <a:t>Convertir solicitudes en Proyectos.</a:t>
+            </a:r>
+          </a:p>
+          <a:p>
+            <a:pPr algn="just">
+              <a:spcBef>
+                <a:spcPts val="1000"/>
+              </a:spcBef>
+              <a:spcAft>
+                <a:spcPts val="600"/>
+              </a:spcAft>
+            </a:pPr>
+            <a:r>
+              <a:rPr lang="es-ES" sz="1800" dirty="0" smtClean="0"/>
+              <a:t>Resúmenes con gráficos e indicadores, sobre las solicitudes ya sea por departamento, área o funcionario.</a:t>
+            </a:r>
+          </a:p>
+          <a:p>
+            <a:pPr algn="just">
+              <a:spcBef>
+                <a:spcPts val="1000"/>
+              </a:spcBef>
+              <a:spcAft>
+                <a:spcPts val="600"/>
+              </a:spcAft>
+            </a:pPr>
+            <a:r>
+              <a:rPr lang="es-ES" sz="1800" dirty="0" smtClean="0"/>
+              <a:t>Alertar de solicitudes retrasadas a los responsables.</a:t>
+            </a:r>
+          </a:p>
+          <a:p>
+            <a:pPr algn="just">
+              <a:spcBef>
+                <a:spcPts val="1000"/>
+              </a:spcBef>
+              <a:spcAft>
+                <a:spcPts val="600"/>
+              </a:spcAft>
+            </a:pPr>
+            <a:r>
+              <a:rPr lang="es-ES" sz="1800" dirty="0" smtClean="0"/>
+              <a:t>Responder solicitudes directamente al solicitante, directamente al jefe de área o manualmente a quien se requiera.</a:t>
+            </a:r>
+            <a:endParaRPr lang="es-ES" sz="1800" dirty="0"/>
+          </a:p>
+          <a:p>
+            <a:pPr lvl="1">
+              <a:lnSpc>
+                <a:spcPct val="90000"/>
+              </a:lnSpc>
               <a:buNone/>
             </a:pPr>
-            <a:endParaRPr lang="es-ES_tradnl" dirty="0"/>
+            <a:endParaRPr lang="es-ES" sz="1800" dirty="0"/>
           </a:p>
         </p:txBody>
       </p:sp>
     </p:spTree>
-    <p:extLst>
-      <p:ext uri="{BB962C8B-B14F-4D97-AF65-F5344CB8AC3E}">
-        <p14:creationId xmlns:p14="http://schemas.microsoft.com/office/powerpoint/2010/main" val="2195754992"/>
-      </p:ext>
-    </p:extLst>
   </p:cSld>
   <p:clrMapOvr>
     <a:masterClrMapping/>
@@ -5395,7 +5401,11 @@
             </a:r>
             <a:r>
               <a:rPr lang="es-ES_tradnl" sz="2000" dirty="0" smtClean="0"/>
-              <a:t>– Requerimientos Funcionales</a:t>
+              <a:t>– Requerimientos </a:t>
+            </a:r>
+            <a:r>
+              <a:rPr lang="es-ES_tradnl" sz="2000" dirty="0"/>
+              <a:t>Funcionales</a:t>
             </a:r>
             <a:endParaRPr lang="es-ES" sz="2000" dirty="0"/>
           </a:p>
@@ -5421,7 +5431,7 @@
           <a:bodyPr/>
           <a:lstStyle/>
           <a:p>
-            <a:pPr algn="just">
+            <a:pPr>
               <a:spcBef>
                 <a:spcPts val="1000"/>
               </a:spcBef>
@@ -5430,24 +5440,12 @@
               </a:spcAft>
             </a:pPr>
             <a:r>
-              <a:rPr lang="es-ES" sz="1800" dirty="0"/>
-              <a:t>Crear y enviar solicitudes de requerimientos, dirigida a cualquiera de las 3 </a:t>
-            </a:r>
-            <a:r>
-              <a:rPr lang="es-ES" sz="1800" dirty="0" smtClean="0"/>
-              <a:t>áreas </a:t>
-            </a:r>
-            <a:r>
-              <a:rPr lang="es-ES" sz="1800" dirty="0"/>
-              <a:t>de </a:t>
-            </a:r>
-            <a:r>
-              <a:rPr lang="es-ES" sz="1800" dirty="0" smtClean="0"/>
-              <a:t>DISICO.</a:t>
-            </a:r>
-          </a:p>
-          <a:p>
-            <a:pPr algn="just">
+              <a:rPr lang="es-ES_tradnl" sz="1800" dirty="0" smtClean="0"/>
+              <a:t>Registrar proyectos.</a:t>
+            </a:r>
+          </a:p>
+          <a:p>
+            <a:pPr>
               <a:spcBef>
                 <a:spcPts val="1000"/>
               </a:spcBef>
@@ -5456,13 +5454,12 @@
               </a:spcAft>
             </a:pPr>
             <a:r>
-              <a:rPr lang="es-ES" sz="1800" dirty="0"/>
-              <a:t>Enviar al email del solicitante el numero de consulta de su solicitud. </a:t>
-            </a:r>
-            <a:endParaRPr lang="es-ES" sz="1800" dirty="0" smtClean="0"/>
-          </a:p>
-          <a:p>
-            <a:pPr algn="just">
+              <a:rPr lang="es-ES_tradnl" sz="1800" dirty="0" smtClean="0"/>
+              <a:t>Definir responsables para las tareas de SCM de cada proyecto.</a:t>
+            </a:r>
+          </a:p>
+          <a:p>
+            <a:pPr>
               <a:spcBef>
                 <a:spcPts val="1000"/>
               </a:spcBef>
@@ -5471,12 +5468,12 @@
               </a:spcAft>
             </a:pPr>
             <a:r>
-              <a:rPr lang="es-ES" sz="1800" dirty="0" smtClean="0"/>
-              <a:t>Asignar Responsables a las Solicitudes.</a:t>
-            </a:r>
-          </a:p>
-          <a:p>
-            <a:pPr algn="just">
+              <a:rPr lang="es-ES_tradnl" sz="1800" dirty="0" smtClean="0"/>
+              <a:t>Registrar ítems de configuración de cada proyecto.</a:t>
+            </a:r>
+          </a:p>
+          <a:p>
+            <a:pPr>
               <a:spcBef>
                 <a:spcPts val="1000"/>
               </a:spcBef>
@@ -5485,12 +5482,12 @@
               </a:spcAft>
             </a:pPr>
             <a:r>
-              <a:rPr lang="es-ES" sz="1800" dirty="0" smtClean="0"/>
-              <a:t>Transferir solicitudes entre las áreas del departamento.</a:t>
-            </a:r>
-          </a:p>
-          <a:p>
-            <a:pPr algn="just">
+              <a:rPr lang="es-ES_tradnl" sz="1800" dirty="0" smtClean="0"/>
+              <a:t>Crear y enviar solicitudes de cambio.</a:t>
+            </a:r>
+          </a:p>
+          <a:p>
+            <a:pPr>
               <a:spcBef>
                 <a:spcPts val="1000"/>
               </a:spcBef>
@@ -5499,12 +5496,12 @@
               </a:spcAft>
             </a:pPr>
             <a:r>
-              <a:rPr lang="es-ES" sz="1800" dirty="0" smtClean="0"/>
-              <a:t>Convertir solicitudes en Proyectos.</a:t>
-            </a:r>
-          </a:p>
-          <a:p>
-            <a:pPr algn="just">
+              <a:rPr lang="es-ES_tradnl" sz="1800" dirty="0" smtClean="0"/>
+              <a:t>Registrar el análisis del impacto de los cambios.</a:t>
+            </a:r>
+          </a:p>
+          <a:p>
+            <a:pPr>
               <a:spcBef>
                 <a:spcPts val="1000"/>
               </a:spcBef>
@@ -5513,12 +5510,12 @@
               </a:spcAft>
             </a:pPr>
             <a:r>
-              <a:rPr lang="es-ES" sz="1800" dirty="0" smtClean="0"/>
-              <a:t>Resúmenes con gráficos e indicadores, sobre las solicitudes ya sea por departamento, área o funcionario.</a:t>
-            </a:r>
-          </a:p>
-          <a:p>
-            <a:pPr algn="just">
+              <a:rPr lang="es-ES_tradnl" sz="1800" dirty="0" smtClean="0"/>
+              <a:t>Ingresar los datos de verificación de implementación de los cambios.</a:t>
+            </a:r>
+          </a:p>
+          <a:p>
+            <a:pPr>
               <a:spcBef>
                 <a:spcPts val="1000"/>
               </a:spcBef>
@@ -5527,12 +5524,12 @@
               </a:spcAft>
             </a:pPr>
             <a:r>
-              <a:rPr lang="es-ES" sz="1800" dirty="0" smtClean="0"/>
-              <a:t>Alertar de solicitudes retrasadas a los responsables.</a:t>
-            </a:r>
-          </a:p>
-          <a:p>
-            <a:pPr algn="just">
+              <a:rPr lang="es-ES_tradnl" sz="1800" dirty="0" smtClean="0"/>
+              <a:t>Definir tareas personalizadas para cada proyecto.</a:t>
+            </a:r>
+          </a:p>
+          <a:p>
+            <a:pPr>
               <a:spcBef>
                 <a:spcPts val="1000"/>
               </a:spcBef>
@@ -5541,10 +5538,29 @@
               </a:spcAft>
             </a:pPr>
             <a:r>
-              <a:rPr lang="es-ES" sz="1800" dirty="0" smtClean="0"/>
-              <a:t>Responder solicitudes directamente al solicitante, directamente al jefe de área o manualmente a quien se requiera.</a:t>
-            </a:r>
-            <a:endParaRPr lang="es-ES" sz="1800" dirty="0"/>
+              <a:rPr lang="es-ES_tradnl" sz="1800" dirty="0" smtClean="0"/>
+              <a:t>Actualizar el avance las tareas de un proyecto.</a:t>
+            </a:r>
+          </a:p>
+          <a:p>
+            <a:pPr>
+              <a:spcBef>
+                <a:spcPts val="1000"/>
+              </a:spcBef>
+              <a:spcAft>
+                <a:spcPts val="600"/>
+              </a:spcAft>
+            </a:pPr>
+            <a:r>
+              <a:rPr lang="es-ES_tradnl" sz="1800" dirty="0" smtClean="0"/>
+              <a:t>Resúmenes de avance de los proyectos.</a:t>
+            </a:r>
+          </a:p>
+          <a:p>
+            <a:endParaRPr lang="es-ES_tradnl" sz="1800" dirty="0" smtClean="0"/>
+          </a:p>
+          <a:p>
+            <a:endParaRPr lang="es-ES_tradnl" sz="1800" dirty="0"/>
           </a:p>
           <a:p>
             <a:pPr lvl="1">
@@ -5558,6 +5574,11 @@
         </p:txBody>
       </p:sp>
     </p:spTree>
+    <p:extLst>
+      <p:ext uri="{BB962C8B-B14F-4D97-AF65-F5344CB8AC3E}">
+        <p14:creationId xmlns:p14="http://schemas.microsoft.com/office/powerpoint/2010/main" val="3489964417"/>
+      </p:ext>
+    </p:extLst>
   </p:cSld>
   <p:clrMapOvr>
     <a:masterClrMapping/>
@@ -5745,7 +5766,7 @@
             </a:r>
             <a:r>
               <a:rPr lang="es-ES_tradnl" sz="2000" dirty="0" smtClean="0"/>
-              <a:t>– Requerimientos </a:t>
+              <a:t>– Requerimientos No </a:t>
             </a:r>
             <a:r>
               <a:rPr lang="es-ES_tradnl" sz="2000" dirty="0"/>
@@ -5775,144 +5796,175 @@
           <a:bodyPr/>
           <a:lstStyle/>
           <a:p>
-            <a:pPr>
-              <a:spcBef>
-                <a:spcPts val="1000"/>
-              </a:spcBef>
-              <a:spcAft>
-                <a:spcPts val="600"/>
-              </a:spcAft>
-            </a:pPr>
-            <a:r>
-              <a:rPr lang="es-ES_tradnl" sz="1800" dirty="0" smtClean="0"/>
-              <a:t>Registrar proyectos.</a:t>
-            </a:r>
-          </a:p>
-          <a:p>
-            <a:pPr>
-              <a:spcBef>
-                <a:spcPts val="1000"/>
-              </a:spcBef>
-              <a:spcAft>
-                <a:spcPts val="600"/>
-              </a:spcAft>
-            </a:pPr>
-            <a:r>
-              <a:rPr lang="es-ES_tradnl" sz="1800" dirty="0" smtClean="0"/>
-              <a:t>Definir responsables para las tareas de SCM de cada proyecto.</a:t>
-            </a:r>
-          </a:p>
-          <a:p>
-            <a:pPr>
-              <a:spcBef>
-                <a:spcPts val="1000"/>
-              </a:spcBef>
-              <a:spcAft>
-                <a:spcPts val="600"/>
-              </a:spcAft>
-            </a:pPr>
-            <a:r>
-              <a:rPr lang="es-ES_tradnl" sz="1800" dirty="0" smtClean="0"/>
-              <a:t>Registrar ítems de configuración de cada proyecto.</a:t>
-            </a:r>
-          </a:p>
-          <a:p>
-            <a:pPr>
-              <a:spcBef>
-                <a:spcPts val="1000"/>
-              </a:spcBef>
-              <a:spcAft>
-                <a:spcPts val="600"/>
-              </a:spcAft>
-            </a:pPr>
-            <a:r>
-              <a:rPr lang="es-ES_tradnl" sz="1800" dirty="0" smtClean="0"/>
-              <a:t>Crear y enviar solicitudes de cambio.</a:t>
-            </a:r>
-          </a:p>
-          <a:p>
-            <a:pPr>
-              <a:spcBef>
-                <a:spcPts val="1000"/>
-              </a:spcBef>
-              <a:spcAft>
-                <a:spcPts val="600"/>
-              </a:spcAft>
-            </a:pPr>
-            <a:r>
-              <a:rPr lang="es-ES_tradnl" sz="1800" dirty="0" smtClean="0"/>
-              <a:t>Registrar el análisis del impacto de los cambios.</a:t>
-            </a:r>
-          </a:p>
-          <a:p>
-            <a:pPr>
-              <a:spcBef>
-                <a:spcPts val="1000"/>
-              </a:spcBef>
-              <a:spcAft>
-                <a:spcPts val="600"/>
-              </a:spcAft>
-            </a:pPr>
-            <a:r>
-              <a:rPr lang="es-ES_tradnl" sz="1800" dirty="0" smtClean="0"/>
-              <a:t>Ingresar los datos de verificación de implementación de los cambios.</a:t>
-            </a:r>
-          </a:p>
-          <a:p>
-            <a:pPr>
-              <a:spcBef>
-                <a:spcPts val="1000"/>
-              </a:spcBef>
-              <a:spcAft>
-                <a:spcPts val="600"/>
-              </a:spcAft>
-            </a:pPr>
-            <a:r>
-              <a:rPr lang="es-ES_tradnl" sz="1800" dirty="0" smtClean="0"/>
-              <a:t>Definir tareas personalizadas para cada proyecto.</a:t>
-            </a:r>
-          </a:p>
-          <a:p>
-            <a:pPr>
-              <a:spcBef>
-                <a:spcPts val="1000"/>
-              </a:spcBef>
-              <a:spcAft>
-                <a:spcPts val="600"/>
-              </a:spcAft>
-            </a:pPr>
-            <a:r>
-              <a:rPr lang="es-ES_tradnl" sz="1800" dirty="0" smtClean="0"/>
-              <a:t>Actualizar el avance las tareas de un proyecto.</a:t>
-            </a:r>
-          </a:p>
-          <a:p>
-            <a:pPr>
-              <a:spcBef>
-                <a:spcPts val="1000"/>
-              </a:spcBef>
-              <a:spcAft>
-                <a:spcPts val="600"/>
-              </a:spcAft>
-            </a:pPr>
-            <a:r>
-              <a:rPr lang="es-ES_tradnl" sz="1800" dirty="0" smtClean="0"/>
-              <a:t>Resúmenes de avance de los proyectos.</a:t>
-            </a:r>
-          </a:p>
-          <a:p>
-            <a:endParaRPr lang="es-ES_tradnl" sz="1800" dirty="0" smtClean="0"/>
-          </a:p>
-          <a:p>
-            <a:endParaRPr lang="es-ES_tradnl" sz="1800" dirty="0"/>
-          </a:p>
-          <a:p>
-            <a:pPr lvl="1">
-              <a:lnSpc>
-                <a:spcPct val="90000"/>
-              </a:lnSpc>
+            <a:pPr algn="just"/>
+            <a:r>
+              <a:rPr lang="es-ES" sz="1800" dirty="0" smtClean="0"/>
+              <a:t>Autenticación </a:t>
+            </a:r>
+            <a:r>
+              <a:rPr lang="es-ES" sz="1800" dirty="0"/>
+              <a:t>de usuarios a </a:t>
+            </a:r>
+            <a:r>
+              <a:rPr lang="es-ES" sz="1800" dirty="0" smtClean="0"/>
+              <a:t>través </a:t>
+            </a:r>
+            <a:r>
+              <a:rPr lang="es-ES" sz="1800" dirty="0"/>
+              <a:t>de SSO. </a:t>
+            </a:r>
+            <a:endParaRPr lang="es-ES" sz="1800" dirty="0" smtClean="0"/>
+          </a:p>
+          <a:p>
+            <a:pPr marL="0" indent="0" algn="just">
               <a:buNone/>
             </a:pPr>
+            <a:endParaRPr lang="es-ES" sz="1800" dirty="0" smtClean="0"/>
+          </a:p>
+          <a:p>
+            <a:pPr algn="just"/>
+            <a:r>
+              <a:rPr lang="es-ES" sz="1800" dirty="0"/>
+              <a:t>La </a:t>
+            </a:r>
+            <a:r>
+              <a:rPr lang="es-ES" sz="1800" dirty="0" smtClean="0"/>
+              <a:t>aplicación </a:t>
+            </a:r>
+            <a:r>
+              <a:rPr lang="es-ES" sz="1800" dirty="0"/>
+              <a:t>no debe verse afectada ante la falla de </a:t>
+            </a:r>
+            <a:r>
+              <a:rPr lang="es-ES" sz="1800" dirty="0" smtClean="0"/>
+              <a:t>algún </a:t>
+            </a:r>
+            <a:r>
+              <a:rPr lang="es-ES" sz="1800" dirty="0"/>
+              <a:t>otro </a:t>
+            </a:r>
+            <a:r>
+              <a:rPr lang="es-ES" sz="1800" dirty="0" smtClean="0"/>
+              <a:t>sistema.</a:t>
+            </a:r>
+          </a:p>
+          <a:p>
+            <a:pPr marL="0" indent="0" algn="just">
+              <a:buNone/>
+            </a:pPr>
+            <a:endParaRPr lang="es-ES" sz="1800" dirty="0"/>
+          </a:p>
+          <a:p>
+            <a:pPr algn="just"/>
+            <a:r>
+              <a:rPr lang="es-ES" sz="1800" dirty="0"/>
+              <a:t>La </a:t>
+            </a:r>
+            <a:r>
+              <a:rPr lang="es-ES" sz="1800" dirty="0" smtClean="0"/>
+              <a:t>aplicación </a:t>
+            </a:r>
+            <a:r>
+              <a:rPr lang="es-ES" sz="1800" dirty="0"/>
+              <a:t>debe estar disponible 24/7. Con un limite frontera aceptable de 20/7 para operaciones de </a:t>
+            </a:r>
+            <a:r>
+              <a:rPr lang="es-ES" sz="1800" dirty="0" smtClean="0"/>
+              <a:t>corrección </a:t>
+            </a:r>
+            <a:r>
+              <a:rPr lang="es-ES" sz="1800" dirty="0"/>
+              <a:t>y </a:t>
+            </a:r>
+            <a:r>
+              <a:rPr lang="es-ES" sz="1800" dirty="0" smtClean="0"/>
+              <a:t>mantenimiento.</a:t>
+            </a:r>
+          </a:p>
+          <a:p>
+            <a:pPr marL="0" indent="0" algn="just">
+              <a:buNone/>
+            </a:pPr>
+            <a:endParaRPr lang="es-ES" sz="1800" dirty="0" smtClean="0"/>
+          </a:p>
+          <a:p>
+            <a:pPr algn="just"/>
+            <a:r>
+              <a:rPr lang="es-ES" sz="1800" dirty="0"/>
+              <a:t>S</a:t>
+            </a:r>
+            <a:r>
+              <a:rPr lang="es-ES" sz="1800" dirty="0" smtClean="0"/>
+              <a:t>oportar </a:t>
+            </a:r>
+            <a:r>
+              <a:rPr lang="es-ES" sz="1800" dirty="0"/>
+              <a:t>una concurrencia de 800 usuarios sin ver </a:t>
+            </a:r>
+            <a:r>
+              <a:rPr lang="es-ES" sz="1800" dirty="0" smtClean="0"/>
+              <a:t>degradados </a:t>
+            </a:r>
+            <a:r>
+              <a:rPr lang="es-ES" sz="1800" dirty="0"/>
+              <a:t>los tiempos de respuestas. </a:t>
+            </a:r>
+            <a:endParaRPr lang="es-ES" sz="1800" dirty="0" smtClean="0"/>
+          </a:p>
+          <a:p>
+            <a:pPr marL="0" indent="0" algn="just">
+              <a:buNone/>
+            </a:pPr>
+            <a:endParaRPr lang="es-ES" sz="1800" dirty="0"/>
+          </a:p>
+          <a:p>
+            <a:pPr algn="just"/>
+            <a:r>
+              <a:rPr lang="es-ES" sz="1800" dirty="0" smtClean="0"/>
+              <a:t>Fácil de usar (Tiempo de aprendizaje máximo </a:t>
+            </a:r>
+            <a:r>
+              <a:rPr lang="es-ES" sz="1800" smtClean="0"/>
+              <a:t>1 día).</a:t>
+            </a:r>
+            <a:endParaRPr lang="es-ES" sz="1800" dirty="0" smtClean="0"/>
+          </a:p>
+          <a:p>
+            <a:pPr marL="0" indent="0" algn="just">
+              <a:buNone/>
+            </a:pPr>
+            <a:endParaRPr lang="es-ES" sz="1800" dirty="0" smtClean="0"/>
+          </a:p>
+          <a:p>
+            <a:pPr algn="just"/>
+            <a:r>
+              <a:rPr lang="es-ES" sz="1800" dirty="0" smtClean="0"/>
+              <a:t>Desarrollar la aplicación utilizando </a:t>
+            </a:r>
+            <a:r>
+              <a:rPr lang="es-ES" sz="1800" dirty="0" err="1" smtClean="0"/>
+              <a:t>PrimeFaces</a:t>
+            </a:r>
+            <a:r>
+              <a:rPr lang="es-ES" sz="1800" dirty="0" smtClean="0"/>
+              <a:t>, </a:t>
+            </a:r>
+            <a:r>
+              <a:rPr lang="es-ES" sz="1800" dirty="0" err="1" smtClean="0"/>
+              <a:t>Hibernate</a:t>
+            </a:r>
+            <a:r>
+              <a:rPr lang="es-ES" sz="1800" dirty="0" smtClean="0"/>
+              <a:t>, </a:t>
+            </a:r>
+            <a:r>
+              <a:rPr lang="es-ES" sz="1800" dirty="0" err="1" smtClean="0"/>
+              <a:t>Glassfish</a:t>
+            </a:r>
+            <a:r>
+              <a:rPr lang="es-ES" sz="1800" dirty="0" smtClean="0"/>
+              <a:t> 3 y SQL Server.</a:t>
+            </a:r>
             <a:endParaRPr lang="es-ES" sz="1800" dirty="0"/>
           </a:p>
         </p:txBody>
@@ -5920,7 +5972,7 @@
     </p:spTree>
     <p:extLst>
       <p:ext uri="{BB962C8B-B14F-4D97-AF65-F5344CB8AC3E}">
-        <p14:creationId xmlns:p14="http://schemas.microsoft.com/office/powerpoint/2010/main" val="3489964417"/>
+        <p14:creationId xmlns:p14="http://schemas.microsoft.com/office/powerpoint/2010/main" val="1052949324"/>
       </p:ext>
     </p:extLst>
   </p:cSld>
@@ -5974,274 +6026,6 @@
           <a:p>
             <a:r>
               <a:rPr lang="es-ES" sz="2000" dirty="0" smtClean="0"/>
-              <a:t>Análisis</a:t>
-            </a:r>
-            <a:r>
-              <a:rPr lang="es-ES_tradnl" sz="2000" dirty="0"/>
-              <a:t> </a:t>
-            </a:r>
-            <a:r>
-              <a:rPr lang="es-ES_tradnl" sz="2000" dirty="0" smtClean="0"/>
-              <a:t>– Requerimientos No </a:t>
-            </a:r>
-            <a:r>
-              <a:rPr lang="es-ES_tradnl" sz="2000" dirty="0"/>
-              <a:t>Funcionales</a:t>
-            </a:r>
-            <a:endParaRPr lang="es-ES" sz="2000" dirty="0"/>
-          </a:p>
-        </p:txBody>
-      </p:sp>
-      <p:sp>
-        <p:nvSpPr>
-          <p:cNvPr id="60419" name="Rectangle 3"/>
-          <p:cNvSpPr>
-            <a:spLocks noGrp="1" noChangeArrowheads="1"/>
-          </p:cNvSpPr>
-          <p:nvPr>
-            <p:ph type="body" idx="1"/>
-          </p:nvPr>
-        </p:nvSpPr>
-        <p:spPr>
-          <a:xfrm>
-            <a:off x="468313" y="2133601"/>
-            <a:ext cx="8229600" cy="4438672"/>
-          </a:xfrm>
-        </p:spPr>
-        <p:txBody>
-          <a:bodyPr/>
-          <a:lstStyle/>
-          <a:p>
-            <a:pPr algn="just"/>
-            <a:r>
-              <a:rPr lang="es-ES" sz="1800" dirty="0" smtClean="0"/>
-              <a:t>Autenticación </a:t>
-            </a:r>
-            <a:r>
-              <a:rPr lang="es-ES" sz="1800" dirty="0"/>
-              <a:t>de usuarios a </a:t>
-            </a:r>
-            <a:r>
-              <a:rPr lang="es-ES" sz="1800" dirty="0" smtClean="0"/>
-              <a:t>través </a:t>
-            </a:r>
-            <a:r>
-              <a:rPr lang="es-ES" sz="1800" dirty="0"/>
-              <a:t>de SSO. </a:t>
-            </a:r>
-            <a:endParaRPr lang="es-ES" sz="1800" dirty="0" smtClean="0"/>
-          </a:p>
-          <a:p>
-            <a:pPr marL="0" indent="0" algn="just">
-              <a:buNone/>
-            </a:pPr>
-            <a:endParaRPr lang="es-ES" sz="1800" dirty="0" smtClean="0"/>
-          </a:p>
-          <a:p>
-            <a:pPr algn="just"/>
-            <a:r>
-              <a:rPr lang="es-ES" sz="1800" dirty="0"/>
-              <a:t>La </a:t>
-            </a:r>
-            <a:r>
-              <a:rPr lang="es-ES" sz="1800" dirty="0" smtClean="0"/>
-              <a:t>aplicación </a:t>
-            </a:r>
-            <a:r>
-              <a:rPr lang="es-ES" sz="1800" dirty="0"/>
-              <a:t>no debe verse afectada ante la falla de </a:t>
-            </a:r>
-            <a:r>
-              <a:rPr lang="es-ES" sz="1800" dirty="0" smtClean="0"/>
-              <a:t>algún </a:t>
-            </a:r>
-            <a:r>
-              <a:rPr lang="es-ES" sz="1800" dirty="0"/>
-              <a:t>otro </a:t>
-            </a:r>
-            <a:r>
-              <a:rPr lang="es-ES" sz="1800" dirty="0" smtClean="0"/>
-              <a:t>sistema.</a:t>
-            </a:r>
-          </a:p>
-          <a:p>
-            <a:pPr marL="0" indent="0" algn="just">
-              <a:buNone/>
-            </a:pPr>
-            <a:endParaRPr lang="es-ES" sz="1800" dirty="0"/>
-          </a:p>
-          <a:p>
-            <a:pPr algn="just"/>
-            <a:r>
-              <a:rPr lang="es-ES" sz="1800" dirty="0"/>
-              <a:t>La </a:t>
-            </a:r>
-            <a:r>
-              <a:rPr lang="es-ES" sz="1800" dirty="0" smtClean="0"/>
-              <a:t>aplicación </a:t>
-            </a:r>
-            <a:r>
-              <a:rPr lang="es-ES" sz="1800" dirty="0"/>
-              <a:t>debe estar disponible 24/7. Con un limite frontera aceptable de 20/7 para operaciones de </a:t>
-            </a:r>
-            <a:r>
-              <a:rPr lang="es-ES" sz="1800" dirty="0" smtClean="0"/>
-              <a:t>corrección </a:t>
-            </a:r>
-            <a:r>
-              <a:rPr lang="es-ES" sz="1800" dirty="0"/>
-              <a:t>y </a:t>
-            </a:r>
-            <a:r>
-              <a:rPr lang="es-ES" sz="1800" dirty="0" smtClean="0"/>
-              <a:t>mantenimiento.</a:t>
-            </a:r>
-          </a:p>
-          <a:p>
-            <a:pPr marL="0" indent="0" algn="just">
-              <a:buNone/>
-            </a:pPr>
-            <a:endParaRPr lang="es-ES" sz="1800" dirty="0" smtClean="0"/>
-          </a:p>
-          <a:p>
-            <a:pPr algn="just"/>
-            <a:r>
-              <a:rPr lang="es-ES" sz="1800" dirty="0"/>
-              <a:t>S</a:t>
-            </a:r>
-            <a:r>
-              <a:rPr lang="es-ES" sz="1800" dirty="0" smtClean="0"/>
-              <a:t>oportar </a:t>
-            </a:r>
-            <a:r>
-              <a:rPr lang="es-ES" sz="1800" dirty="0"/>
-              <a:t>una concurrencia de 800 usuarios sin ver </a:t>
-            </a:r>
-            <a:r>
-              <a:rPr lang="es-ES" sz="1800" dirty="0" smtClean="0"/>
-              <a:t>degradados </a:t>
-            </a:r>
-            <a:r>
-              <a:rPr lang="es-ES" sz="1800" dirty="0"/>
-              <a:t>los tiempos de respuestas. </a:t>
-            </a:r>
-            <a:endParaRPr lang="es-ES" sz="1800" dirty="0" smtClean="0"/>
-          </a:p>
-          <a:p>
-            <a:pPr marL="0" indent="0" algn="just">
-              <a:buNone/>
-            </a:pPr>
-            <a:endParaRPr lang="es-ES" sz="1800" dirty="0"/>
-          </a:p>
-          <a:p>
-            <a:pPr algn="just"/>
-            <a:r>
-              <a:rPr lang="es-ES" sz="1800" dirty="0" smtClean="0"/>
-              <a:t>Fácil de usar (Tiempo de aprendizaje máximo </a:t>
-            </a:r>
-            <a:r>
-              <a:rPr lang="es-ES" sz="1800" smtClean="0"/>
-              <a:t>1 día).</a:t>
-            </a:r>
-            <a:endParaRPr lang="es-ES" sz="1800" dirty="0" smtClean="0"/>
-          </a:p>
-          <a:p>
-            <a:pPr marL="0" indent="0" algn="just">
-              <a:buNone/>
-            </a:pPr>
-            <a:endParaRPr lang="es-ES" sz="1800" dirty="0" smtClean="0"/>
-          </a:p>
-          <a:p>
-            <a:pPr algn="just"/>
-            <a:r>
-              <a:rPr lang="es-ES" sz="1800" dirty="0" smtClean="0"/>
-              <a:t>Desarrollar la aplicación utilizando </a:t>
-            </a:r>
-            <a:r>
-              <a:rPr lang="es-ES" sz="1800" dirty="0" err="1" smtClean="0"/>
-              <a:t>PrimeFaces</a:t>
-            </a:r>
-            <a:r>
-              <a:rPr lang="es-ES" sz="1800" dirty="0" smtClean="0"/>
-              <a:t>, </a:t>
-            </a:r>
-            <a:r>
-              <a:rPr lang="es-ES" sz="1800" dirty="0" err="1" smtClean="0"/>
-              <a:t>Hibernate</a:t>
-            </a:r>
-            <a:r>
-              <a:rPr lang="es-ES" sz="1800" dirty="0" smtClean="0"/>
-              <a:t>, </a:t>
-            </a:r>
-            <a:r>
-              <a:rPr lang="es-ES" sz="1800" dirty="0" err="1" smtClean="0"/>
-              <a:t>Glassfish</a:t>
-            </a:r>
-            <a:r>
-              <a:rPr lang="es-ES" sz="1800" dirty="0" smtClean="0"/>
-              <a:t> 3 y SQL Server.</a:t>
-            </a:r>
-            <a:endParaRPr lang="es-ES" sz="1800" dirty="0"/>
-          </a:p>
-        </p:txBody>
-      </p:sp>
-    </p:spTree>
-    <p:extLst>
-      <p:ext uri="{BB962C8B-B14F-4D97-AF65-F5344CB8AC3E}">
-        <p14:creationId xmlns:p14="http://schemas.microsoft.com/office/powerpoint/2010/main" val="1052949324"/>
-      </p:ext>
-    </p:extLst>
-  </p:cSld>
-  <p:clrMapOvr>
-    <a:masterClrMapping/>
-  </p:clrMapOvr>
-  <p:transition xmlns:p14="http://schemas.microsoft.com/office/powerpoint/2010/main" spd="med">
-    <p:push dir="u"/>
-  </p:transition>
-  <p:timing>
-    <p:tnLst>
-      <p:par>
-        <p:cTn xmlns:p14="http://schemas.microsoft.com/office/powerpoint/2010/main" id="1" dur="indefinite" restart="never" nodeType="tmRoot"/>
-      </p:par>
-    </p:tnLst>
-  </p:timing>
-</p:sld>
-</file>
-
-<file path=ppt/slides/slide22.xml><?xml version="1.0" encoding="utf-8"?>
-<p:sld xmlns:a="http://schemas.openxmlformats.org/drawingml/2006/main" xmlns:r="http://schemas.openxmlformats.org/officeDocument/2006/relationships" xmlns:p="http://schemas.openxmlformats.org/presentationml/2006/main">
-  <p:cSld>
-    <p:spTree>
-      <p:nvGrpSpPr>
-        <p:cNvPr id="1" name=""/>
-        <p:cNvGrpSpPr/>
-        <p:nvPr/>
-      </p:nvGrpSpPr>
-      <p:grpSpPr>
-        <a:xfrm>
-          <a:off x="0" y="0"/>
-          <a:ext cx="0" cy="0"/>
-          <a:chOff x="0" y="0"/>
-          <a:chExt cx="0" cy="0"/>
-        </a:xfrm>
-      </p:grpSpPr>
-      <p:sp>
-        <p:nvSpPr>
-          <p:cNvPr id="60418" name="Rectangle 2"/>
-          <p:cNvSpPr>
-            <a:spLocks noGrp="1" noChangeArrowheads="1"/>
-          </p:cNvSpPr>
-          <p:nvPr>
-            <p:ph type="title"/>
-          </p:nvPr>
-        </p:nvSpPr>
-        <p:spPr/>
-        <p:txBody>
-          <a:bodyPr/>
-          <a:lstStyle/>
-          <a:p>
-            <a:r>
-              <a:rPr lang="es-ES" sz="2000" dirty="0" smtClean="0"/>
               <a:t>Análisis - </a:t>
             </a:r>
             <a:r>
@@ -6472,7 +6256,7 @@
 </p:sld>
 </file>
 
-<file path=ppt/slides/slide23.xml><?xml version="1.0" encoding="utf-8"?>
+<file path=ppt/slides/slide22.xml><?xml version="1.0" encoding="utf-8"?>
 <p:sld xmlns:a="http://schemas.openxmlformats.org/drawingml/2006/main" xmlns:r="http://schemas.openxmlformats.org/officeDocument/2006/relationships" xmlns:p="http://schemas.openxmlformats.org/presentationml/2006/main">
   <p:cSld>
     <p:spTree>
@@ -6600,7 +6384,7 @@
 </p:sld>
 </file>
 
-<file path=ppt/slides/slide24.xml><?xml version="1.0" encoding="utf-8"?>
+<file path=ppt/slides/slide23.xml><?xml version="1.0" encoding="utf-8"?>
 <p:sld xmlns:a="http://schemas.openxmlformats.org/drawingml/2006/main" xmlns:r="http://schemas.openxmlformats.org/officeDocument/2006/relationships" xmlns:p="http://schemas.openxmlformats.org/presentationml/2006/main">
   <p:cSld>
     <p:spTree>
@@ -6740,7 +6524,7 @@
 </p:sld>
 </file>
 
-<file path=ppt/slides/slide25.xml><?xml version="1.0" encoding="utf-8"?>
+<file path=ppt/slides/slide24.xml><?xml version="1.0" encoding="utf-8"?>
 <p:sld xmlns:a="http://schemas.openxmlformats.org/drawingml/2006/main" xmlns:r="http://schemas.openxmlformats.org/officeDocument/2006/relationships" xmlns:p="http://schemas.openxmlformats.org/presentationml/2006/main">
   <p:cSld>
     <p:spTree>
@@ -6840,7 +6624,7 @@
         </p:blipFill>
         <p:spPr>
           <a:xfrm>
-            <a:off x="611560" y="1882216"/>
+            <a:off x="611560" y="1844824"/>
             <a:ext cx="7992888" cy="4871086"/>
           </a:xfrm>
           <a:prstGeom prst="rect">
@@ -6871,7 +6655,7 @@
 </p:sld>
 </file>
 
-<file path=ppt/slides/slide26.xml><?xml version="1.0" encoding="utf-8"?>
+<file path=ppt/slides/slide25.xml><?xml version="1.0" encoding="utf-8"?>
 <p:sld xmlns:a="http://schemas.openxmlformats.org/drawingml/2006/main" xmlns:r="http://schemas.openxmlformats.org/officeDocument/2006/relationships" xmlns:p="http://schemas.openxmlformats.org/presentationml/2006/main">
   <p:cSld>
     <p:spTree>
@@ -7193,7 +6977,7 @@
 </p:sld>
 </file>
 
-<file path=ppt/slides/slide27.xml><?xml version="1.0" encoding="utf-8"?>
+<file path=ppt/slides/slide26.xml><?xml version="1.0" encoding="utf-8"?>
 <p:sld xmlns:a="http://schemas.openxmlformats.org/drawingml/2006/main" xmlns:r="http://schemas.openxmlformats.org/officeDocument/2006/relationships" xmlns:p="http://schemas.openxmlformats.org/presentationml/2006/main">
   <p:cSld>
     <p:spTree>
@@ -7258,15 +7042,7 @@
             </a:r>
             <a:r>
               <a:rPr lang="es-ES" sz="1600" dirty="0" smtClean="0"/>
-              <a:t>Valpara</a:t>
-            </a:r>
-            <a:r>
-              <a:rPr lang="es-ES" sz="1600" dirty="0" smtClean="0"/>
-              <a:t>í</a:t>
-            </a:r>
-            <a:r>
-              <a:rPr lang="es-ES" sz="1600" dirty="0" smtClean="0"/>
-              <a:t>so</a:t>
+              <a:t>Valparaíso</a:t>
             </a:r>
             <a:r>
               <a:rPr lang="es-ES" sz="1600" dirty="0"/>
@@ -7274,15 +7050,7 @@
             </a:r>
             <a:r>
               <a:rPr lang="es-ES" sz="1600" dirty="0" smtClean="0"/>
-              <a:t>Direcci</a:t>
-            </a:r>
-            <a:r>
-              <a:rPr lang="es-ES" sz="1600" dirty="0" smtClean="0"/>
-              <a:t>ó</a:t>
-            </a:r>
-            <a:r>
-              <a:rPr lang="es-ES" sz="1600" dirty="0" smtClean="0"/>
-              <a:t>n </a:t>
+              <a:t>Dirección </a:t>
             </a:r>
             <a:r>
               <a:rPr lang="es-ES" sz="1600" dirty="0"/>
@@ -7290,15 +7058,7 @@
             </a:r>
             <a:r>
               <a:rPr lang="es-ES" sz="1600" dirty="0" smtClean="0"/>
-              <a:t>informaci</a:t>
-            </a:r>
-            <a:r>
-              <a:rPr lang="es-ES" sz="1600" dirty="0" smtClean="0"/>
-              <a:t>ó</a:t>
-            </a:r>
-            <a:r>
-              <a:rPr lang="es-ES" sz="1600" dirty="0" smtClean="0"/>
-              <a:t>n </a:t>
+              <a:t>información </a:t>
             </a:r>
             <a:r>
               <a:rPr lang="es-ES" sz="1600" dirty="0"/>
@@ -7306,15 +7066,7 @@
             </a:r>
             <a:r>
               <a:rPr lang="es-ES" sz="1600" dirty="0" smtClean="0"/>
-              <a:t>computaci</a:t>
-            </a:r>
-            <a:r>
-              <a:rPr lang="es-ES" sz="1600" dirty="0" smtClean="0"/>
-              <a:t>ó</a:t>
-            </a:r>
-            <a:r>
-              <a:rPr lang="es-ES" sz="1600" dirty="0" smtClean="0"/>
-              <a:t>n</a:t>
+              <a:t>computación</a:t>
             </a:r>
             <a:r>
               <a:rPr lang="es-ES" sz="1600" dirty="0"/>
@@ -7322,11 +7074,7 @@
             </a:r>
             <a:r>
               <a:rPr lang="es-ES" sz="1600" dirty="0" smtClean="0"/>
-              <a:t>Ú</a:t>
-            </a:r>
-            <a:r>
-              <a:rPr lang="es-ES" sz="1600" dirty="0" smtClean="0"/>
-              <a:t>ltimo acceso: 4 Abril 2012</a:t>
+              <a:t>Último acceso: 4 Abril 2012</a:t>
             </a:r>
             <a:r>
               <a:rPr lang="es-ES" sz="1600" dirty="0"/>
@@ -7340,7 +7088,6 @@
               <a:rPr lang="es-ES" sz="1600" dirty="0"/>
               <a:t>. </a:t>
             </a:r>
-            <a:endParaRPr lang="es-ES" sz="1600" dirty="0"/>
           </a:p>
           <a:p>
             <a:pPr algn="just">
@@ -7354,15 +7101,7 @@
             </a:r>
             <a:r>
               <a:rPr lang="es-ES" sz="1600" dirty="0" smtClean="0"/>
-              <a:t>M</a:t>
-            </a:r>
-            <a:r>
-              <a:rPr lang="es-ES" sz="1600" dirty="0" smtClean="0"/>
-              <a:t>é</a:t>
-            </a:r>
-            <a:r>
-              <a:rPr lang="es-ES" sz="1600" dirty="0" smtClean="0"/>
-              <a:t>ndez</a:t>
+              <a:t>Méndez</a:t>
             </a:r>
             <a:r>
               <a:rPr lang="es-ES" sz="1600" dirty="0"/>
@@ -7370,15 +7109,7 @@
             </a:r>
             <a:r>
               <a:rPr lang="es-ES" sz="1600" dirty="0" smtClean="0"/>
-              <a:t>Metodolog</a:t>
-            </a:r>
-            <a:r>
-              <a:rPr lang="es-ES" sz="1600" dirty="0" smtClean="0"/>
-              <a:t>í</a:t>
-            </a:r>
-            <a:r>
-              <a:rPr lang="es-ES" sz="1600" dirty="0" smtClean="0"/>
-              <a:t>as </a:t>
+              <a:t>Metodologías </a:t>
             </a:r>
             <a:r>
               <a:rPr lang="es-ES" sz="1600" dirty="0"/>
@@ -7386,15 +7117,7 @@
             </a:r>
             <a:r>
               <a:rPr lang="es-ES" sz="1600" dirty="0" smtClean="0"/>
-              <a:t>Direcci</a:t>
-            </a:r>
-            <a:r>
-              <a:rPr lang="es-ES" sz="1600" dirty="0" smtClean="0"/>
-              <a:t>ó</a:t>
-            </a:r>
-            <a:r>
-              <a:rPr lang="es-ES" sz="1600" dirty="0" smtClean="0"/>
-              <a:t>n </a:t>
+              <a:t>Dirección </a:t>
             </a:r>
             <a:r>
               <a:rPr lang="es-ES" sz="1600" dirty="0"/>
@@ -7410,15 +7133,7 @@
             </a:r>
             <a:r>
               <a:rPr lang="es-ES" sz="1600" dirty="0" smtClean="0"/>
-              <a:t>Informaci</a:t>
-            </a:r>
-            <a:r>
-              <a:rPr lang="es-ES" sz="1600" dirty="0" smtClean="0"/>
-              <a:t>ó</a:t>
-            </a:r>
-            <a:r>
-              <a:rPr lang="es-ES" sz="1600" dirty="0" smtClean="0"/>
-              <a:t>n </a:t>
+              <a:t>Información </a:t>
             </a:r>
             <a:r>
               <a:rPr lang="es-ES" sz="1600" dirty="0"/>
@@ -7426,15 +7141,7 @@
             </a:r>
             <a:r>
               <a:rPr lang="es-ES" sz="1600" dirty="0" smtClean="0"/>
-              <a:t>Computaci</a:t>
-            </a:r>
-            <a:r>
-              <a:rPr lang="es-ES" sz="1600" dirty="0" smtClean="0"/>
-              <a:t>ó</a:t>
-            </a:r>
-            <a:r>
-              <a:rPr lang="es-ES" sz="1600" dirty="0" smtClean="0"/>
-              <a:t>n</a:t>
+              <a:t>Computación</a:t>
             </a:r>
             <a:r>
               <a:rPr lang="es-ES" sz="1600" dirty="0"/>
@@ -7442,15 +7149,7 @@
             </a:r>
             <a:r>
               <a:rPr lang="es-ES" sz="1600" dirty="0" smtClean="0"/>
-              <a:t>T</a:t>
-            </a:r>
-            <a:r>
-              <a:rPr lang="es-ES" sz="1600" dirty="0" smtClean="0"/>
-              <a:t>í</a:t>
-            </a:r>
-            <a:r>
-              <a:rPr lang="es-ES" sz="1600" dirty="0" smtClean="0"/>
-              <a:t>tulo</a:t>
+              <a:t>Título</a:t>
             </a:r>
             <a:r>
               <a:rPr lang="es-ES" sz="1600" dirty="0"/>
@@ -7458,15 +7157,7 @@
             </a:r>
             <a:r>
               <a:rPr lang="es-ES" sz="1600" dirty="0" smtClean="0"/>
-              <a:t>Valpara</a:t>
-            </a:r>
-            <a:r>
-              <a:rPr lang="es-ES" sz="1600" dirty="0" smtClean="0"/>
-              <a:t>í</a:t>
-            </a:r>
-            <a:r>
-              <a:rPr lang="es-ES" sz="1600" dirty="0" smtClean="0"/>
-              <a:t>so</a:t>
+              <a:t>Valparaíso</a:t>
             </a:r>
             <a:r>
               <a:rPr lang="es-ES" sz="1600" dirty="0"/>
@@ -7486,15 +7177,7 @@
             </a:r>
             <a:r>
               <a:rPr lang="es-ES" sz="1600" dirty="0" smtClean="0"/>
-              <a:t>ITILv3 Gesti</a:t>
-            </a:r>
-            <a:r>
-              <a:rPr lang="es-ES" sz="1600" dirty="0" smtClean="0"/>
-              <a:t>ó</a:t>
-            </a:r>
-            <a:r>
-              <a:rPr lang="es-ES" sz="1600" dirty="0" smtClean="0"/>
-              <a:t>n de Servicios TI</a:t>
+              <a:t>ITILv3 Gestión de Servicios TI</a:t>
             </a:r>
             <a:r>
               <a:rPr lang="es-ES" sz="1600" dirty="0"/>
@@ -7502,15 +7185,7 @@
             </a:r>
             <a:r>
               <a:rPr lang="es-ES" sz="1600" dirty="0" smtClean="0"/>
-              <a:t>” </a:t>
-            </a:r>
-            <a:r>
-              <a:rPr lang="es-ES" sz="1600" dirty="0" smtClean="0"/>
-              <a:t>Ú</a:t>
-            </a:r>
-            <a:r>
-              <a:rPr lang="es-ES" sz="1600" dirty="0" smtClean="0"/>
-              <a:t>ltimo acceso: 1 Mayo 2012, http</a:t>
+              <a:t>” Último acceso: 1 Mayo 2012, http</a:t>
             </a:r>
             <a:r>
               <a:rPr lang="es-ES" sz="1600" dirty="0"/>
@@ -7798,7 +7473,6 @@
               <a:rPr lang="es-ES" sz="1600" dirty="0"/>
               <a:t>, Inc., 2012. </a:t>
             </a:r>
-            <a:endParaRPr lang="es-ES" sz="1600" dirty="0"/>
           </a:p>
           <a:p>
             <a:endParaRPr lang="es-ES" sz="1800" dirty="0"/>
@@ -7830,7 +7504,7 @@
 </p:sld>
 </file>
 
-<file path=ppt/slides/slide28.xml><?xml version="1.0" encoding="utf-8"?>
+<file path=ppt/slides/slide27.xml><?xml version="1.0" encoding="utf-8"?>
 <p:sld xmlns:a="http://schemas.openxmlformats.org/drawingml/2006/main" xmlns:r="http://schemas.openxmlformats.org/officeDocument/2006/relationships" xmlns:p="http://schemas.openxmlformats.org/presentationml/2006/main">
   <p:cSld>
     <p:spTree>
@@ -7987,10 +7661,10 @@
           <a:lstStyle/>
           <a:p>
             <a:r>
-              <a:rPr lang="es-ES_tradnl"/>
-              <a:t>Ámbito (máx 1)</a:t>
-            </a:r>
-            <a:endParaRPr lang="es-ES"/>
+              <a:rPr lang="es-ES_tradnl" dirty="0" smtClean="0"/>
+              <a:t>Ámbito</a:t>
+            </a:r>
+            <a:endParaRPr lang="es-ES" dirty="0"/>
           </a:p>
         </p:txBody>
       </p:sp>
@@ -8126,15 +7800,7 @@
             </a:r>
             <a:r>
               <a:rPr lang="es-ES_tradnl" dirty="0"/>
-              <a:t>- </a:t>
-            </a:r>
-            <a:r>
-              <a:rPr lang="es-ES_tradnl" dirty="0"/>
-              <a:t>Técnicas </a:t>
-            </a:r>
-            <a:r>
-              <a:rPr lang="es-ES_tradnl" dirty="0"/>
-              <a:t>Existentes</a:t>
+              <a:t>- Técnicas Existentes</a:t>
             </a:r>
             <a:endParaRPr lang="es-ES" dirty="0"/>
           </a:p>
@@ -8202,15 +7868,7 @@
             </a:r>
             <a:r>
               <a:rPr lang="es-ES_tradnl" sz="1800" b="1" i="1" dirty="0" smtClean="0"/>
-              <a:t>– Petici</a:t>
-            </a:r>
-            <a:r>
-              <a:rPr lang="es-ES_tradnl" sz="1800" b="1" i="1" dirty="0" smtClean="0"/>
-              <a:t>ó</a:t>
-            </a:r>
-            <a:r>
-              <a:rPr lang="es-ES_tradnl" sz="1800" b="1" i="1" dirty="0" smtClean="0"/>
-              <a:t>n </a:t>
+              <a:t>– Petición </a:t>
             </a:r>
             <a:r>
               <a:rPr lang="es-ES_tradnl" sz="1800" b="1" i="1" dirty="0"/>
@@ -8230,23 +7888,7 @@
             </a:r>
             <a:r>
               <a:rPr lang="es-ES_tradnl" sz="1800" dirty="0" smtClean="0"/>
-              <a:t>proporcion</a:t>
-            </a:r>
-            <a:r>
-              <a:rPr lang="es-ES_tradnl" sz="1800" dirty="0" smtClean="0"/>
-              <a:t>á</a:t>
-            </a:r>
-            <a:r>
-              <a:rPr lang="es-ES_tradnl" sz="1800" dirty="0" smtClean="0"/>
-              <a:t>ndoles informaci</a:t>
-            </a:r>
-            <a:r>
-              <a:rPr lang="es-ES_tradnl" sz="1800" dirty="0" smtClean="0"/>
-              <a:t>ó</a:t>
-            </a:r>
-            <a:r>
-              <a:rPr lang="es-ES_tradnl" sz="1800" dirty="0" smtClean="0"/>
-              <a:t>n </a:t>
+              <a:t>proporcionándoles información </a:t>
             </a:r>
             <a:r>
               <a:rPr lang="es-ES_tradnl" sz="1800" dirty="0"/>
@@ -8254,15 +7896,7 @@
             </a:r>
             <a:r>
               <a:rPr lang="es-ES_tradnl" sz="1800" dirty="0" smtClean="0"/>
-              <a:t>r</a:t>
-            </a:r>
-            <a:r>
-              <a:rPr lang="es-ES_tradnl" sz="1800" dirty="0" smtClean="0"/>
-              <a:t>á</a:t>
-            </a:r>
-            <a:r>
-              <a:rPr lang="es-ES_tradnl" sz="1800" dirty="0" smtClean="0"/>
-              <a:t>pido </a:t>
+              <a:t>rápido </a:t>
             </a:r>
             <a:r>
               <a:rPr lang="es-ES_tradnl" sz="1800" dirty="0"/>
@@ -8270,15 +7904,7 @@
             </a:r>
             <a:r>
               <a:rPr lang="es-ES_tradnl" sz="1800" dirty="0" smtClean="0"/>
-              <a:t>est</a:t>
-            </a:r>
-            <a:r>
-              <a:rPr lang="es-ES_tradnl" sz="1800" dirty="0" smtClean="0"/>
-              <a:t>á</a:t>
-            </a:r>
-            <a:r>
-              <a:rPr lang="es-ES_tradnl" sz="1800" dirty="0" smtClean="0"/>
-              <a:t>ndar </a:t>
+              <a:t>estándar </a:t>
             </a:r>
             <a:r>
               <a:rPr lang="es-ES_tradnl" sz="1800" dirty="0"/>
@@ -8286,23 +7912,7 @@
             </a:r>
             <a:r>
               <a:rPr lang="es-ES_tradnl" sz="1800" dirty="0" smtClean="0"/>
-              <a:t>organizaci</a:t>
-            </a:r>
-            <a:r>
-              <a:rPr lang="es-ES_tradnl" sz="1800" dirty="0" smtClean="0"/>
-              <a:t>ó</a:t>
-            </a:r>
-            <a:r>
-              <a:rPr lang="es-ES_tradnl" sz="1800" dirty="0" smtClean="0"/>
-              <a:t>n TI (solicitudes de informaci</a:t>
-            </a:r>
-            <a:r>
-              <a:rPr lang="es-ES_tradnl" sz="1800" dirty="0" smtClean="0"/>
-              <a:t>ón, acceso a servicios o de cambio estándar</a:t>
-            </a:r>
-            <a:r>
-              <a:rPr lang="es-ES_tradnl" sz="1800" dirty="0" smtClean="0"/>
-              <a:t>).  </a:t>
+              <a:t>organización TI (solicitudes de información, acceso a servicios o de cambio estándar).  </a:t>
             </a:r>
           </a:p>
           <a:p>
@@ -8317,15 +7927,7 @@
             </a:r>
             <a:r>
               <a:rPr lang="es-ES_tradnl" sz="1800" b="1" dirty="0" smtClean="0"/>
-              <a:t>– Gesti</a:t>
-            </a:r>
-            <a:r>
-              <a:rPr lang="es-ES_tradnl" sz="1800" b="1" dirty="0" smtClean="0"/>
-              <a:t>ó</a:t>
-            </a:r>
-            <a:r>
-              <a:rPr lang="es-ES_tradnl" sz="1800" b="1" dirty="0" smtClean="0"/>
-              <a:t>n </a:t>
+              <a:t>– Gestión </a:t>
             </a:r>
             <a:r>
               <a:rPr lang="es-ES_tradnl" sz="1800" b="1" dirty="0"/>
@@ -8337,11 +7939,7 @@
             </a:r>
             <a:r>
               <a:rPr lang="es-ES_tradnl" sz="1800" dirty="0" smtClean="0"/>
-              <a:t>Proceso para resolver de la manera mas rápida y eficaz posible cualquier incidente que cause una interrupci</a:t>
-            </a:r>
-            <a:r>
-              <a:rPr lang="es-ES_tradnl" sz="1800" dirty="0" smtClean="0"/>
-              <a:t>ón en el servició.</a:t>
+              <a:t>Proceso para resolver de la manera mas rápida y eficaz posible cualquier incidente que cause una interrupción en el servició.</a:t>
             </a:r>
             <a:endParaRPr lang="es-ES_tradnl" sz="1800" dirty="0"/>
           </a:p>
@@ -8415,15 +8013,7 @@
             </a:r>
             <a:r>
               <a:rPr lang="es-ES_tradnl" dirty="0"/>
-              <a:t>- </a:t>
-            </a:r>
-            <a:r>
-              <a:rPr lang="es-ES_tradnl" dirty="0"/>
-              <a:t>Técnicas </a:t>
-            </a:r>
-            <a:r>
-              <a:rPr lang="es-ES_tradnl" dirty="0"/>
-              <a:t>Existentes</a:t>
+              <a:t>- Técnicas Existentes</a:t>
             </a:r>
             <a:endParaRPr lang="es-ES" dirty="0"/>
           </a:p>
@@ -8571,15 +8161,7 @@
             </a:r>
             <a:r>
               <a:rPr lang="es-ES_tradnl" sz="1800" b="1" i="1" dirty="0" smtClean="0"/>
-              <a:t>– Gesti</a:t>
-            </a:r>
-            <a:r>
-              <a:rPr lang="es-ES_tradnl" sz="1800" b="1" i="1" dirty="0" smtClean="0"/>
-              <a:t>ó</a:t>
-            </a:r>
-            <a:r>
-              <a:rPr lang="es-ES_tradnl" sz="1800" b="1" i="1" dirty="0" smtClean="0"/>
-              <a:t>n </a:t>
+              <a:t>– Gestión </a:t>
             </a:r>
             <a:r>
               <a:rPr lang="es-ES_tradnl" sz="1800" b="1" i="1" dirty="0"/>
@@ -8617,15 +8199,7 @@
             </a:r>
             <a:r>
               <a:rPr lang="es-ES_tradnl" sz="1800" b="1" i="1" dirty="0" smtClean="0"/>
-              <a:t>– Gesti</a:t>
-            </a:r>
-            <a:r>
-              <a:rPr lang="es-ES_tradnl" sz="1800" b="1" i="1" dirty="0" smtClean="0"/>
-              <a:t>ó</a:t>
-            </a:r>
-            <a:r>
-              <a:rPr lang="es-ES_tradnl" sz="1800" b="1" i="1" dirty="0" smtClean="0"/>
-              <a:t>n </a:t>
+              <a:t>– Gestión </a:t>
             </a:r>
             <a:r>
               <a:rPr lang="es-ES_tradnl" sz="1800" b="1" i="1" dirty="0"/>
@@ -8633,15 +8207,7 @@
             </a:r>
             <a:r>
               <a:rPr lang="es-ES_tradnl" sz="1800" b="1" i="1" dirty="0" smtClean="0"/>
-              <a:t>Configuraci</a:t>
-            </a:r>
-            <a:r>
-              <a:rPr lang="es-ES_tradnl" sz="1800" b="1" i="1" dirty="0" smtClean="0"/>
-              <a:t>ó</a:t>
-            </a:r>
-            <a:r>
-              <a:rPr lang="es-ES_tradnl" sz="1800" b="1" i="1" dirty="0" smtClean="0"/>
-              <a:t>n </a:t>
+              <a:t>Configuración </a:t>
             </a:r>
             <a:r>
               <a:rPr lang="es-ES_tradnl" sz="1800" b="1" i="1" dirty="0"/>
@@ -8988,11 +8554,7 @@
             </a:r>
             <a:r>
               <a:rPr lang="es-ES_tradnl" sz="2000" dirty="0" smtClean="0"/>
-              <a:t> existentes son bastante completas, pero ninguna cumple completamente con todas las necesidades manifestadas por el cliente. </a:t>
-            </a:r>
-            <a:r>
-              <a:rPr lang="es-ES_tradnl" sz="2000" dirty="0" smtClean="0"/>
-              <a:t>Una de las principales causas es que no se adecuan al flujo de trabajo que se desea mantener en DISICO.</a:t>
+              <a:t> existentes son bastante completas, pero ninguna cumple completamente con todas las necesidades manifestadas por el cliente. Una de las principales causas es que no se adecuan al flujo de trabajo que se desea mantener en DISICO.</a:t>
             </a:r>
           </a:p>
           <a:p>
@@ -9011,11 +8573,7 @@
             </a:r>
             <a:r>
               <a:rPr lang="es-ES_tradnl" sz="2000" dirty="0" smtClean="0"/>
-              <a:t>están principalmente enfocadas al proceso de control de versiones y no a la gesti</a:t>
-            </a:r>
-            <a:r>
-              <a:rPr lang="es-ES_tradnl" sz="2000" dirty="0" smtClean="0"/>
-              <a:t>ón de cambios, solo una presta funciones para este proceso desde la enfoque de ITIL, pero no brinda un soporte completo para la metodología actual de SCM de DISICO.</a:t>
+              <a:t>están principalmente enfocadas al proceso de control de versiones y no a la gestión de cambios, solo una presta funciones para este proceso desde la enfoque de ITIL, pero no brinda un soporte completo para la metodología actual de SCM de DISICO.</a:t>
             </a:r>
             <a:endParaRPr lang="es-ES" sz="2000" dirty="0"/>
           </a:p>
@@ -9153,15 +8711,7 @@
             </a:r>
             <a:r>
               <a:rPr lang="es-ES" sz="2000" dirty="0" smtClean="0"/>
-              <a:t>La mayoría de los estándares para SCM ya fueron analizados anteriormente para la formulaci</a:t>
-            </a:r>
-            <a:r>
-              <a:rPr lang="es-ES" sz="2000" dirty="0" smtClean="0"/>
-              <a:t>ón de la metodología de SCM</a:t>
-            </a:r>
-            <a:r>
-              <a:rPr lang="es-ES" sz="2000" dirty="0" smtClean="0"/>
-              <a:t> actual, a la cual se pretende dar soporte y no remplazar. Sin embargo se considera importante rescatar la idea de relacionar solicitudes de cambios con solicitudes de requerimientos planteada por ITIL v3.</a:t>
+              <a:t>La mayoría de los estándares para SCM ya fueron analizados anteriormente para la formulación de la metodología de SCM actual, a la cual se pretende dar soporte y no remplazar. Sin embargo se considera importante rescatar la idea de relacionar solicitudes de cambios con solicitudes de requerimientos planteada por ITIL v3.</a:t>
             </a:r>
             <a:endParaRPr lang="es-ES" sz="2000" dirty="0"/>
           </a:p>
@@ -9249,7 +8799,6 @@
               <a:rPr lang="es-ES" sz="1800" dirty="0"/>
               <a:t>Actualmente para que una solicitud de requerimiento sea llevada a cabo, se deben seguir los siguientes pasos: </a:t>
             </a:r>
-            <a:endParaRPr lang="es-ES" sz="1800" dirty="0"/>
           </a:p>
           <a:p>
             <a:pPr algn="just">
@@ -9288,11 +8837,7 @@
             </a:r>
             <a:r>
               <a:rPr lang="es-ES" sz="1800" dirty="0" smtClean="0"/>
-              <a:t>á</a:t>
-            </a:r>
-            <a:r>
-              <a:rPr lang="es-ES" sz="1800" dirty="0" smtClean="0"/>
-              <a:t>rea evalúa </a:t>
+              <a:t>área evalúa </a:t>
             </a:r>
             <a:r>
               <a:rPr lang="es-ES" sz="1800" dirty="0"/>
@@ -9314,15 +8859,7 @@
             </a:r>
             <a:r>
               <a:rPr lang="es-ES" sz="1800" dirty="0" smtClean="0"/>
-              <a:t>autorizaci</a:t>
-            </a:r>
-            <a:r>
-              <a:rPr lang="es-ES" sz="1800" dirty="0" smtClean="0"/>
-              <a:t>ó</a:t>
-            </a:r>
-            <a:r>
-              <a:rPr lang="es-ES" sz="1800" dirty="0" smtClean="0"/>
-              <a:t>n </a:t>
+              <a:t>autorización </a:t>
             </a:r>
             <a:r>
               <a:rPr lang="es-ES" sz="1800" dirty="0"/>
@@ -9360,15 +8897,7 @@
             </a:r>
             <a:r>
               <a:rPr lang="es-ES" sz="1800" dirty="0" smtClean="0"/>
-              <a:t>justificaci</a:t>
-            </a:r>
-            <a:r>
-              <a:rPr lang="es-ES" sz="1800" dirty="0" smtClean="0"/>
-              <a:t>ó</a:t>
-            </a:r>
-            <a:r>
-              <a:rPr lang="es-ES" sz="1800" dirty="0" smtClean="0"/>
-              <a:t>n </a:t>
+              <a:t>justificación </a:t>
             </a:r>
             <a:r>
               <a:rPr lang="es-ES" sz="1800" dirty="0"/>
@@ -9390,11 +8919,7 @@
             </a:r>
             <a:r>
               <a:rPr lang="es-ES" sz="1800" dirty="0" smtClean="0"/>
-              <a:t>á</a:t>
-            </a:r>
-            <a:r>
-              <a:rPr lang="es-ES" sz="1800" dirty="0" smtClean="0"/>
-              <a:t>rea </a:t>
+              <a:t>área </a:t>
             </a:r>
             <a:r>
               <a:rPr lang="es-ES" sz="1800" dirty="0"/>
@@ -9418,15 +8943,7 @@
             </a:r>
             <a:r>
               <a:rPr lang="es-ES" sz="1800" dirty="0" smtClean="0"/>
-              <a:t>descripci</a:t>
-            </a:r>
-            <a:r>
-              <a:rPr lang="es-ES" sz="1800" dirty="0" smtClean="0"/>
-              <a:t>ó</a:t>
-            </a:r>
-            <a:r>
-              <a:rPr lang="es-ES" sz="1800" dirty="0" smtClean="0"/>
-              <a:t>n </a:t>
+              <a:t>descripción </a:t>
             </a:r>
             <a:r>
               <a:rPr lang="es-ES" sz="1800" dirty="0"/>

</xml_diff>